<commit_message>
End of day 6
</commit_message>
<xml_diff>
--- a/Selenium_WebDriver_Advanced_Usage_V2.pptx
+++ b/Selenium_WebDriver_Advanced_Usage_V2.pptx
@@ -218,7 +218,7 @@
             <a:fld id="{2E03A1FB-12CB-49E6-809F-DA2D2089BF59}" type="datetimeFigureOut">
               <a:rPr lang="en-US" smtClean="0"/>
               <a:pPr/>
-              <a:t>4/17/20</a:t>
+              <a:t>5/20/20</a:t>
             </a:fld>
             <a:endParaRPr lang="en-US" dirty="0"/>
           </a:p>
@@ -4549,8 +4549,12 @@
           <a:lstStyle/>
           <a:p>
             <a:r>
+              <a:rPr lang="en-US"/>
+              <a:t>Selenium WebDriver </a:t>
+            </a:r>
+            <a:r>
               <a:rPr lang="en-US" dirty="0"/>
-              <a:t>Selenium Webdriver – Advanced Usage</a:t>
+              <a:t>– Advanced Usage</a:t>
             </a:r>
           </a:p>
         </p:txBody>
@@ -5489,7 +5493,7 @@
                   <a:srgbClr val="0070C0"/>
                 </a:solidFill>
               </a:rPr>
-              <a:t>Webdriver</a:t>
+              <a:t>WebDriver</a:t>
             </a:r>
             <a:r>
               <a:rPr lang="en-US" sz="2000" dirty="0">
@@ -6997,12 +7001,12 @@
           </a:p>
           <a:p>
             <a:r>
-              <a:rPr lang="en-US" sz="2000" dirty="0">
+              <a:rPr lang="en-US" sz="2000" dirty="0" err="1">
                 <a:solidFill>
                   <a:srgbClr val="0070C0"/>
                 </a:solidFill>
               </a:rPr>
-              <a:t>WebdriverWait</a:t>
+              <a:t>WebDriverWait</a:t>
             </a:r>
             <a:r>
               <a:rPr lang="en-US" sz="2000" dirty="0">
@@ -7034,7 +7038,23 @@
                   <a:srgbClr val="0070C0"/>
                 </a:solidFill>
               </a:rPr>
-              <a:t>= new WebdriverWait(</a:t>
+              <a:t>= new </a:t>
+            </a:r>
+            <a:r>
+              <a:rPr lang="en-US" sz="2000" dirty="0" err="1">
+                <a:solidFill>
+                  <a:srgbClr val="0070C0"/>
+                </a:solidFill>
+              </a:rPr>
+              <a:t>WebDriverWait</a:t>
+            </a:r>
+            <a:r>
+              <a:rPr lang="en-US" sz="2000" dirty="0">
+                <a:solidFill>
+                  <a:srgbClr val="0070C0"/>
+                </a:solidFill>
+              </a:rPr>
+              <a:t>(</a:t>
             </a:r>
             <a:r>
               <a:rPr lang="en-US" sz="2000" dirty="0">
@@ -7174,12 +7194,20 @@
               <a:buChar char="•"/>
             </a:pPr>
             <a:r>
+              <a:rPr lang="en-US" sz="2000" dirty="0" err="1">
+                <a:solidFill>
+                  <a:schemeClr val="bg1"/>
+                </a:solidFill>
+              </a:rPr>
+              <a:t>WebDriverWait</a:t>
+            </a:r>
+            <a:r>
               <a:rPr lang="en-US" sz="2000" dirty="0">
                 <a:solidFill>
                   <a:schemeClr val="bg1"/>
                 </a:solidFill>
               </a:rPr>
-              <a:t>WebdriverWait by default calls the ExpectedCondition every 500 milliseconds until it returns successfully</a:t>
+              <a:t> by default calls the ExpectedCondition every 500 milliseconds until it returns successfully</a:t>
             </a:r>
           </a:p>
         </p:txBody>
@@ -8290,7 +8318,7 @@
                   <a:srgbClr val="0070C0"/>
                 </a:solidFill>
               </a:rPr>
-              <a:t>wait</a:t>
+              <a:t>Wait</a:t>
             </a:r>
             <a:r>
               <a:rPr lang="en-US" dirty="0">
@@ -8959,7 +8987,7 @@
                   <a:srgbClr val="0070C0"/>
                 </a:solidFill>
               </a:rPr>
-              <a:t>FluentWait&lt;Webdriver&gt;</a:t>
+              <a:t>FluentWait&lt;WebDriver&gt;</a:t>
             </a:r>
             <a:r>
               <a:rPr lang="en-US" sz="2000" dirty="0">
@@ -9001,7 +9029,7 @@
                   <a:srgbClr val="0070C0"/>
                 </a:solidFill>
               </a:rPr>
-              <a:t>FluentWait&lt;Webdriver&gt;(</a:t>
+              <a:t>FluentWait&lt;WebDriver&gt;(</a:t>
             </a:r>
             <a:r>
               <a:rPr lang="en-US" sz="2000" dirty="0">
@@ -10165,68 +10193,6 @@
 </file>
 
 <file path=customXml/item1.xml><?xml version="1.0" encoding="utf-8"?>
-<p:properties xmlns:p="http://schemas.microsoft.com/office/2006/metadata/properties" xmlns:xsi="http://www.w3.org/2001/XMLSchema-instance">
-  <documentManagement>
-    <Work_x0020_request xmlns="05686ec9-621b-4d4e-b044-e44970800757" xsi:nil="true"/>
-    <_x0043_M4 xmlns="05686ec9-621b-4d4e-b044-e44970800757" xsi:nil="true"/>
-    <ViewCount xmlns="05686ec9-621b-4d4e-b044-e44970800757">20</ViewCount>
-    <Rating1 xmlns="05686ec9-621b-4d4e-b044-e44970800757" xsi:nil="true"/>
-    <_x0043_M5 xmlns="05686ec9-621b-4d4e-b044-e44970800757" xsi:nil="true"/>
-    <Rating2 xmlns="05686ec9-621b-4d4e-b044-e44970800757" xsi:nil="true"/>
-    <ClientSupplied xmlns="05686ec9-621b-4d4e-b044-e44970800757" xsi:nil="true"/>
-    <_x0043_M6 xmlns="05686ec9-621b-4d4e-b044-e44970800757" xsi:nil="true"/>
-    <Rating3 xmlns="05686ec9-621b-4d4e-b044-e44970800757" xsi:nil="true"/>
-    <_x0043_M7 xmlns="05686ec9-621b-4d4e-b044-e44970800757" xsi:nil="true"/>
-    <CheckedOutPath xmlns="05686ec9-621b-4d4e-b044-e44970800757" xsi:nil="true"/>
-    <ApprovalStatus xmlns="05686ec9-621b-4d4e-b044-e44970800757" xsi:nil="true"/>
-    <MBID xmlns="05686ec9-621b-4d4e-b044-e44970800757" xsi:nil="true"/>
-    <AssociateID xmlns="05686ec9-621b-4d4e-b044-e44970800757" xsi:nil="true"/>
-    <ProjectID xmlns="05686ec9-621b-4d4e-b044-e44970800757" xsi:nil="true"/>
-    <Releases xmlns="05686ec9-621b-4d4e-b044-e44970800757" xsi:nil="true"/>
-    <UnmappedDocuments xmlns="05686ec9-621b-4d4e-b044-e44970800757" xsi:nil="true"/>
-    <Comments xmlns="05686ec9-621b-4d4e-b044-e44970800757" xsi:nil="true"/>
-    <Phase xmlns="05686ec9-621b-4d4e-b044-e44970800757" xsi:nil="true"/>
-    <_x0043_M8 xmlns="05686ec9-621b-4d4e-b044-e44970800757" xsi:nil="true"/>
-    <_x0043_M9 xmlns="05686ec9-621b-4d4e-b044-e44970800757" xsi:nil="true"/>
-    <CreatedTime xmlns="05686ec9-621b-4d4e-b044-e44970800757" xsi:nil="true"/>
-    <Activities xmlns="05686ec9-621b-4d4e-b044-e44970800757" xsi:nil="true"/>
-    <CopySource xmlns="05686ec9-621b-4d4e-b044-e44970800757" xsi:nil="true"/>
-    <SubProjectID xmlns="05686ec9-621b-4d4e-b044-e44970800757" xsi:nil="true"/>
-    <Functional_x0020_Module3 xmlns="05686ec9-621b-4d4e-b044-e44970800757" xsi:nil="true"/>
-    <CopyToPath xmlns="05686ec9-621b-4d4e-b044-e44970800757" xsi:nil="true"/>
-    <BaselinedVersions xmlns="05686ec9-621b-4d4e-b044-e44970800757" xsi:nil="true"/>
-    <_x0043_M10 xmlns="05686ec9-621b-4d4e-b044-e44970800757" xsi:nil="true"/>
-    <Functional_x0020_Modules xmlns="05686ec9-621b-4d4e-b044-e44970800757" xsi:nil="true"/>
-    <Functional_x0020_Module2 xmlns="05686ec9-621b-4d4e-b044-e44970800757" xsi:nil="true"/>
-    <ArtifactStatus xmlns="05686ec9-621b-4d4e-b044-e44970800757" xsi:nil="true"/>
-    <ReasonforRejection xmlns="05686ec9-621b-4d4e-b044-e44970800757" xsi:nil="true"/>
-    <FolderPath xmlns="05686ec9-621b-4d4e-b044-e44970800757" xsi:nil="true"/>
-    <Rating4 xmlns="05686ec9-621b-4d4e-b044-e44970800757" xsi:nil="true"/>
-    <Rating5 xmlns="05686ec9-621b-4d4e-b044-e44970800757" xsi:nil="true"/>
-    <_x0043_M1 xmlns="05686ec9-621b-4d4e-b044-e44970800757" xsi:nil="true"/>
-    <Role xmlns="05686ec9-621b-4d4e-b044-e44970800757" xsi:nil="true"/>
-    <Processes xmlns="05686ec9-621b-4d4e-b044-e44970800757" xsi:nil="true"/>
-    <LatestDownloads xmlns="05686ec9-621b-4d4e-b044-e44970800757" xsi:nil="true"/>
-    <FolderId xmlns="05686ec9-621b-4d4e-b044-e44970800757" xsi:nil="true"/>
-    <_x0043_M2 xmlns="05686ec9-621b-4d4e-b044-e44970800757" xsi:nil="true"/>
-    <AccountID xmlns="05686ec9-621b-4d4e-b044-e44970800757" xsi:nil="true"/>
-    <Tags xmlns="05686ec9-621b-4d4e-b044-e44970800757" xsi:nil="true"/>
-    <AverageRating xmlns="05686ec9-621b-4d4e-b044-e44970800757" xsi:nil="true"/>
-    <_x0043_M3 xmlns="05686ec9-621b-4d4e-b044-e44970800757" xsi:nil="true"/>
-  </documentManagement>
-</p:properties>
-</file>
-
-<file path=customXml/item2.xml><?xml version="1.0" encoding="utf-8"?>
-<?mso-contentType ?>
-<FormTemplates xmlns="http://schemas.microsoft.com/sharepoint/v3/contenttype/forms">
-  <Display>DocumentLibraryForm</Display>
-  <Edit>DocumentLibraryForm</Edit>
-  <New>DocumentLibraryForm</New>
-</FormTemplates>
-</file>
-
-<file path=customXml/item3.xml><?xml version="1.0" encoding="utf-8"?>
 <ct:contentTypeSchema xmlns:ct="http://schemas.microsoft.com/office/2006/metadata/contentType" xmlns:ma="http://schemas.microsoft.com/office/2006/metadata/properties/metaAttributes" ct:_="" ma:_="" ma:contentTypeName="Document" ma:contentTypeID="0x0101007B39C2D19CB1EB4EB957C296FF889379" ma:contentTypeVersion="46" ma:contentTypeDescription="Create a new document." ma:contentTypeScope="" ma:versionID="d76e7b19da747d2797abee5bd65afe53">
   <xsd:schema xmlns:xsd="http://www.w3.org/2001/XMLSchema" xmlns:xs="http://www.w3.org/2001/XMLSchema" xmlns:p="http://schemas.microsoft.com/office/2006/metadata/properties" xmlns:ns2="05686ec9-621b-4d4e-b044-e44970800757" targetNamespace="http://schemas.microsoft.com/office/2006/metadata/properties" ma:root="true" ma:fieldsID="6706f00be75213024a94f9e90a3ca398" ns2:_="">
     <xsd:import namespace="05686ec9-621b-4d4e-b044-e44970800757"/>
@@ -10626,24 +10592,69 @@
 </ct:contentTypeSchema>
 </file>
 
-<file path=customXml/itemProps1.xml><?xml version="1.0" encoding="utf-8"?>
-<ds:datastoreItem xmlns:ds="http://schemas.openxmlformats.org/officeDocument/2006/customXml" ds:itemID="{A7C481EB-8F30-4DBE-97E4-C47F16554C60}">
-  <ds:schemaRefs>
-    <ds:schemaRef ds:uri="http://schemas.microsoft.com/office/2006/metadata/properties"/>
-    <ds:schemaRef ds:uri="05686ec9-621b-4d4e-b044-e44970800757"/>
-  </ds:schemaRefs>
-</ds:datastoreItem>
+<file path=customXml/item2.xml><?xml version="1.0" encoding="utf-8"?>
+<?mso-contentType ?>
+<FormTemplates xmlns="http://schemas.microsoft.com/sharepoint/v3/contenttype/forms">
+  <Display>DocumentLibraryForm</Display>
+  <Edit>DocumentLibraryForm</Edit>
+  <New>DocumentLibraryForm</New>
+</FormTemplates>
 </file>
 
-<file path=customXml/itemProps2.xml><?xml version="1.0" encoding="utf-8"?>
-<ds:datastoreItem xmlns:ds="http://schemas.openxmlformats.org/officeDocument/2006/customXml" ds:itemID="{4587111D-7DFB-442C-9FE3-44380E208E2D}">
-  <ds:schemaRefs>
-    <ds:schemaRef ds:uri="http://schemas.microsoft.com/sharepoint/v3/contenttype/forms"/>
-  </ds:schemaRefs>
-</ds:datastoreItem>
+<file path=customXml/item3.xml><?xml version="1.0" encoding="utf-8"?>
+<p:properties xmlns:p="http://schemas.microsoft.com/office/2006/metadata/properties" xmlns:xsi="http://www.w3.org/2001/XMLSchema-instance">
+  <documentManagement>
+    <Work_x0020_request xmlns="05686ec9-621b-4d4e-b044-e44970800757" xsi:nil="true"/>
+    <_x0043_M4 xmlns="05686ec9-621b-4d4e-b044-e44970800757" xsi:nil="true"/>
+    <ViewCount xmlns="05686ec9-621b-4d4e-b044-e44970800757">20</ViewCount>
+    <Rating1 xmlns="05686ec9-621b-4d4e-b044-e44970800757" xsi:nil="true"/>
+    <_x0043_M5 xmlns="05686ec9-621b-4d4e-b044-e44970800757" xsi:nil="true"/>
+    <Rating2 xmlns="05686ec9-621b-4d4e-b044-e44970800757" xsi:nil="true"/>
+    <ClientSupplied xmlns="05686ec9-621b-4d4e-b044-e44970800757" xsi:nil="true"/>
+    <_x0043_M6 xmlns="05686ec9-621b-4d4e-b044-e44970800757" xsi:nil="true"/>
+    <Rating3 xmlns="05686ec9-621b-4d4e-b044-e44970800757" xsi:nil="true"/>
+    <_x0043_M7 xmlns="05686ec9-621b-4d4e-b044-e44970800757" xsi:nil="true"/>
+    <CheckedOutPath xmlns="05686ec9-621b-4d4e-b044-e44970800757" xsi:nil="true"/>
+    <ApprovalStatus xmlns="05686ec9-621b-4d4e-b044-e44970800757" xsi:nil="true"/>
+    <MBID xmlns="05686ec9-621b-4d4e-b044-e44970800757" xsi:nil="true"/>
+    <AssociateID xmlns="05686ec9-621b-4d4e-b044-e44970800757" xsi:nil="true"/>
+    <ProjectID xmlns="05686ec9-621b-4d4e-b044-e44970800757" xsi:nil="true"/>
+    <Releases xmlns="05686ec9-621b-4d4e-b044-e44970800757" xsi:nil="true"/>
+    <UnmappedDocuments xmlns="05686ec9-621b-4d4e-b044-e44970800757" xsi:nil="true"/>
+    <Comments xmlns="05686ec9-621b-4d4e-b044-e44970800757" xsi:nil="true"/>
+    <Phase xmlns="05686ec9-621b-4d4e-b044-e44970800757" xsi:nil="true"/>
+    <_x0043_M8 xmlns="05686ec9-621b-4d4e-b044-e44970800757" xsi:nil="true"/>
+    <_x0043_M9 xmlns="05686ec9-621b-4d4e-b044-e44970800757" xsi:nil="true"/>
+    <CreatedTime xmlns="05686ec9-621b-4d4e-b044-e44970800757" xsi:nil="true"/>
+    <Activities xmlns="05686ec9-621b-4d4e-b044-e44970800757" xsi:nil="true"/>
+    <CopySource xmlns="05686ec9-621b-4d4e-b044-e44970800757" xsi:nil="true"/>
+    <SubProjectID xmlns="05686ec9-621b-4d4e-b044-e44970800757" xsi:nil="true"/>
+    <Functional_x0020_Module3 xmlns="05686ec9-621b-4d4e-b044-e44970800757" xsi:nil="true"/>
+    <CopyToPath xmlns="05686ec9-621b-4d4e-b044-e44970800757" xsi:nil="true"/>
+    <BaselinedVersions xmlns="05686ec9-621b-4d4e-b044-e44970800757" xsi:nil="true"/>
+    <_x0043_M10 xmlns="05686ec9-621b-4d4e-b044-e44970800757" xsi:nil="true"/>
+    <Functional_x0020_Modules xmlns="05686ec9-621b-4d4e-b044-e44970800757" xsi:nil="true"/>
+    <Functional_x0020_Module2 xmlns="05686ec9-621b-4d4e-b044-e44970800757" xsi:nil="true"/>
+    <ArtifactStatus xmlns="05686ec9-621b-4d4e-b044-e44970800757" xsi:nil="true"/>
+    <ReasonforRejection xmlns="05686ec9-621b-4d4e-b044-e44970800757" xsi:nil="true"/>
+    <FolderPath xmlns="05686ec9-621b-4d4e-b044-e44970800757" xsi:nil="true"/>
+    <Rating4 xmlns="05686ec9-621b-4d4e-b044-e44970800757" xsi:nil="true"/>
+    <Rating5 xmlns="05686ec9-621b-4d4e-b044-e44970800757" xsi:nil="true"/>
+    <_x0043_M1 xmlns="05686ec9-621b-4d4e-b044-e44970800757" xsi:nil="true"/>
+    <Role xmlns="05686ec9-621b-4d4e-b044-e44970800757" xsi:nil="true"/>
+    <Processes xmlns="05686ec9-621b-4d4e-b044-e44970800757" xsi:nil="true"/>
+    <LatestDownloads xmlns="05686ec9-621b-4d4e-b044-e44970800757" xsi:nil="true"/>
+    <FolderId xmlns="05686ec9-621b-4d4e-b044-e44970800757" xsi:nil="true"/>
+    <_x0043_M2 xmlns="05686ec9-621b-4d4e-b044-e44970800757" xsi:nil="true"/>
+    <AccountID xmlns="05686ec9-621b-4d4e-b044-e44970800757" xsi:nil="true"/>
+    <Tags xmlns="05686ec9-621b-4d4e-b044-e44970800757" xsi:nil="true"/>
+    <AverageRating xmlns="05686ec9-621b-4d4e-b044-e44970800757" xsi:nil="true"/>
+    <_x0043_M3 xmlns="05686ec9-621b-4d4e-b044-e44970800757" xsi:nil="true"/>
+  </documentManagement>
+</p:properties>
 </file>
 
-<file path=customXml/itemProps3.xml><?xml version="1.0" encoding="utf-8"?>
+<file path=customXml/itemProps1.xml><?xml version="1.0" encoding="utf-8"?>
 <ds:datastoreItem xmlns:ds="http://schemas.openxmlformats.org/officeDocument/2006/customXml" ds:itemID="{42674B21-9DFB-441E-9F32-D8D0D8C76520}">
   <ds:schemaRefs>
     <ds:schemaRef ds:uri="http://schemas.microsoft.com/office/2006/metadata/contentType"/>
@@ -10659,4 +10670,21 @@
     <ds:schemaRef ds:uri="http://schemas.microsoft.com/internal/obd"/>
   </ds:schemaRefs>
 </ds:datastoreItem>
+</file>
+
+<file path=customXml/itemProps2.xml><?xml version="1.0" encoding="utf-8"?>
+<ds:datastoreItem xmlns:ds="http://schemas.openxmlformats.org/officeDocument/2006/customXml" ds:itemID="{4587111D-7DFB-442C-9FE3-44380E208E2D}">
+  <ds:schemaRefs>
+    <ds:schemaRef ds:uri="http://schemas.microsoft.com/sharepoint/v3/contenttype/forms"/>
+  </ds:schemaRefs>
+</ds:datastoreItem>
+</file>
+
+<file path=customXml/itemProps3.xml><?xml version="1.0" encoding="utf-8"?>
+<ds:datastoreItem xmlns:ds="http://schemas.openxmlformats.org/officeDocument/2006/customXml" ds:itemID="{A7C481EB-8F30-4DBE-97E4-C47F16554C60}">
+  <ds:schemaRefs>
+    <ds:schemaRef ds:uri="http://schemas.microsoft.com/office/2006/metadata/properties"/>
+    <ds:schemaRef ds:uri="05686ec9-621b-4d4e-b044-e44970800757"/>
+  </ds:schemaRefs>
+</ds:datastoreItem>
 </file>
</xml_diff>